<commit_message>
Updated ChituneSAK diagram -- I had forgotten C128 BASIC
</commit_message>
<xml_diff>
--- a/docs/ChiptuneSAK.pptx
+++ b/docs/ChiptuneSAK.pptx
@@ -288,7 +288,7 @@
           <a:p>
             <a:fld id="{A8EB1DD1-E6DA-49B6-AE15-0187F720A3F3}" type="datetimeFigureOut">
               <a:rPr lang="en-US" smtClean="0"/>
-              <a:t>3/24/2020</a:t>
+              <a:t>4/9/2020</a:t>
             </a:fld>
             <a:endParaRPr lang="en-US"/>
           </a:p>
@@ -458,7 +458,7 @@
           <a:p>
             <a:fld id="{A8EB1DD1-E6DA-49B6-AE15-0187F720A3F3}" type="datetimeFigureOut">
               <a:rPr lang="en-US" smtClean="0"/>
-              <a:t>3/24/2020</a:t>
+              <a:t>4/9/2020</a:t>
             </a:fld>
             <a:endParaRPr lang="en-US"/>
           </a:p>
@@ -638,7 +638,7 @@
           <a:p>
             <a:fld id="{A8EB1DD1-E6DA-49B6-AE15-0187F720A3F3}" type="datetimeFigureOut">
               <a:rPr lang="en-US" smtClean="0"/>
-              <a:t>3/24/2020</a:t>
+              <a:t>4/9/2020</a:t>
             </a:fld>
             <a:endParaRPr lang="en-US"/>
           </a:p>
@@ -808,7 +808,7 @@
           <a:p>
             <a:fld id="{A8EB1DD1-E6DA-49B6-AE15-0187F720A3F3}" type="datetimeFigureOut">
               <a:rPr lang="en-US" smtClean="0"/>
-              <a:t>3/24/2020</a:t>
+              <a:t>4/9/2020</a:t>
             </a:fld>
             <a:endParaRPr lang="en-US"/>
           </a:p>
@@ -1054,7 +1054,7 @@
           <a:p>
             <a:fld id="{A8EB1DD1-E6DA-49B6-AE15-0187F720A3F3}" type="datetimeFigureOut">
               <a:rPr lang="en-US" smtClean="0"/>
-              <a:t>3/24/2020</a:t>
+              <a:t>4/9/2020</a:t>
             </a:fld>
             <a:endParaRPr lang="en-US"/>
           </a:p>
@@ -1342,7 +1342,7 @@
           <a:p>
             <a:fld id="{A8EB1DD1-E6DA-49B6-AE15-0187F720A3F3}" type="datetimeFigureOut">
               <a:rPr lang="en-US" smtClean="0"/>
-              <a:t>3/24/2020</a:t>
+              <a:t>4/9/2020</a:t>
             </a:fld>
             <a:endParaRPr lang="en-US"/>
           </a:p>
@@ -1764,7 +1764,7 @@
           <a:p>
             <a:fld id="{A8EB1DD1-E6DA-49B6-AE15-0187F720A3F3}" type="datetimeFigureOut">
               <a:rPr lang="en-US" smtClean="0"/>
-              <a:t>3/24/2020</a:t>
+              <a:t>4/9/2020</a:t>
             </a:fld>
             <a:endParaRPr lang="en-US"/>
           </a:p>
@@ -1882,7 +1882,7 @@
           <a:p>
             <a:fld id="{A8EB1DD1-E6DA-49B6-AE15-0187F720A3F3}" type="datetimeFigureOut">
               <a:rPr lang="en-US" smtClean="0"/>
-              <a:t>3/24/2020</a:t>
+              <a:t>4/9/2020</a:t>
             </a:fld>
             <a:endParaRPr lang="en-US"/>
           </a:p>
@@ -1977,7 +1977,7 @@
           <a:p>
             <a:fld id="{A8EB1DD1-E6DA-49B6-AE15-0187F720A3F3}" type="datetimeFigureOut">
               <a:rPr lang="en-US" smtClean="0"/>
-              <a:t>3/24/2020</a:t>
+              <a:t>4/9/2020</a:t>
             </a:fld>
             <a:endParaRPr lang="en-US"/>
           </a:p>
@@ -2254,7 +2254,7 @@
           <a:p>
             <a:fld id="{A8EB1DD1-E6DA-49B6-AE15-0187F720A3F3}" type="datetimeFigureOut">
               <a:rPr lang="en-US" smtClean="0"/>
-              <a:t>3/24/2020</a:t>
+              <a:t>4/9/2020</a:t>
             </a:fld>
             <a:endParaRPr lang="en-US"/>
           </a:p>
@@ -2507,7 +2507,7 @@
           <a:p>
             <a:fld id="{A8EB1DD1-E6DA-49B6-AE15-0187F720A3F3}" type="datetimeFigureOut">
               <a:rPr lang="en-US" smtClean="0"/>
-              <a:t>3/24/2020</a:t>
+              <a:t>4/9/2020</a:t>
             </a:fld>
             <a:endParaRPr lang="en-US"/>
           </a:p>
@@ -2720,7 +2720,7 @@
           <a:p>
             <a:fld id="{A8EB1DD1-E6DA-49B6-AE15-0187F720A3F3}" type="datetimeFigureOut">
               <a:rPr lang="en-US" smtClean="0"/>
-              <a:t>3/24/2020</a:t>
+              <a:t>4/9/2020</a:t>
             </a:fld>
             <a:endParaRPr lang="en-US"/>
           </a:p>
@@ -3295,7 +3295,7 @@
         </p:nvSpPr>
         <p:spPr>
           <a:xfrm>
-            <a:off x="7627961" y="1746344"/>
+            <a:off x="7590431" y="1444103"/>
             <a:ext cx="914400" cy="774510"/>
           </a:xfrm>
           <a:prstGeom prst="flowChartDocument">
@@ -3398,8 +3398,8 @@
         </p:nvCxnSpPr>
         <p:spPr>
           <a:xfrm flipV="1">
-            <a:off x="5066732" y="2133599"/>
-            <a:ext cx="2561229" cy="277504"/>
+            <a:off x="5066732" y="1831358"/>
+            <a:ext cx="2523699" cy="579745"/>
           </a:xfrm>
           <a:prstGeom prst="straightConnector1">
             <a:avLst/>
@@ -3435,8 +3435,8 @@
         </p:nvSpPr>
         <p:spPr>
           <a:xfrm>
-            <a:off x="555578" y="4718144"/>
-            <a:ext cx="968422" cy="762000"/>
+            <a:off x="493026" y="4718144"/>
+            <a:ext cx="990600" cy="762000"/>
           </a:xfrm>
           <a:prstGeom prst="flowChartDocument">
             <a:avLst/>
@@ -3738,8 +3738,8 @@
         </p:nvCxnSpPr>
         <p:spPr>
           <a:xfrm>
-            <a:off x="1524000" y="5099144"/>
-            <a:ext cx="1905000" cy="0"/>
+            <a:off x="1483626" y="5099144"/>
+            <a:ext cx="1945374" cy="0"/>
           </a:xfrm>
           <a:prstGeom prst="straightConnector1">
             <a:avLst/>
@@ -3935,7 +3935,7 @@
         </p:nvSpPr>
         <p:spPr>
           <a:xfrm>
-            <a:off x="7620000" y="2736944"/>
+            <a:off x="7590431" y="2434703"/>
             <a:ext cx="914400" cy="774510"/>
           </a:xfrm>
           <a:prstGeom prst="flowChartDocument">
@@ -3995,7 +3995,7 @@
         </p:nvSpPr>
         <p:spPr>
           <a:xfrm>
-            <a:off x="7620000" y="3727544"/>
+            <a:off x="7590431" y="3425303"/>
             <a:ext cx="914400" cy="774510"/>
           </a:xfrm>
           <a:prstGeom prst="flowChartDocument">
@@ -4059,8 +4059,8 @@
         </p:nvSpPr>
         <p:spPr>
           <a:xfrm>
-            <a:off x="7588724" y="4713595"/>
-            <a:ext cx="968422" cy="762000"/>
+            <a:off x="7590430" y="5452280"/>
+            <a:ext cx="914401" cy="762000"/>
           </a:xfrm>
           <a:prstGeom prst="flowChartDocument">
             <a:avLst/>
@@ -4122,8 +4122,8 @@
         </p:nvCxnSpPr>
         <p:spPr>
           <a:xfrm flipV="1">
-            <a:off x="5752532" y="3124199"/>
-            <a:ext cx="1867468" cy="645994"/>
+            <a:off x="5752532" y="2821958"/>
+            <a:ext cx="1837899" cy="948235"/>
           </a:xfrm>
           <a:prstGeom prst="straightConnector1">
             <a:avLst/>
@@ -4163,7 +4163,7 @@
         <p:spPr>
           <a:xfrm>
             <a:off x="5066732" y="2411103"/>
-            <a:ext cx="2553268" cy="713096"/>
+            <a:ext cx="2523699" cy="410855"/>
           </a:xfrm>
           <a:prstGeom prst="straightConnector1">
             <a:avLst/>
@@ -4203,7 +4203,7 @@
         <p:spPr>
           <a:xfrm>
             <a:off x="5752532" y="3770193"/>
-            <a:ext cx="1867468" cy="344606"/>
+            <a:ext cx="1837899" cy="42365"/>
           </a:xfrm>
           <a:prstGeom prst="straightConnector1">
             <a:avLst/>
@@ -4241,9 +4241,9 @@
           <p:nvPr/>
         </p:nvCxnSpPr>
         <p:spPr>
-          <a:xfrm flipV="1">
-            <a:off x="4648200" y="5094595"/>
-            <a:ext cx="2940524" cy="4549"/>
+          <a:xfrm>
+            <a:off x="4648200" y="5099144"/>
+            <a:ext cx="2942230" cy="734136"/>
           </a:xfrm>
           <a:prstGeom prst="straightConnector1">
             <a:avLst/>
@@ -4371,6 +4371,130 @@
           </a:p>
         </p:txBody>
       </p:sp>
+      <p:sp>
+        <p:nvSpPr>
+          <p:cNvPr id="31" name="Flowchart: Document 30"/>
+          <p:cNvSpPr/>
+          <p:nvPr/>
+        </p:nvSpPr>
+        <p:spPr>
+          <a:xfrm>
+            <a:off x="7590431" y="4427844"/>
+            <a:ext cx="914400" cy="774510"/>
+          </a:xfrm>
+          <a:prstGeom prst="flowChartDocument">
+            <a:avLst/>
+          </a:prstGeom>
+          <a:solidFill>
+            <a:schemeClr val="bg1"/>
+          </a:solidFill>
+          <a:ln>
+            <a:solidFill>
+              <a:schemeClr val="tx1"/>
+            </a:solidFill>
+          </a:ln>
+        </p:spPr>
+        <p:style>
+          <a:lnRef idx="2">
+            <a:schemeClr val="accent1">
+              <a:shade val="50000"/>
+            </a:schemeClr>
+          </a:lnRef>
+          <a:fillRef idx="1">
+            <a:schemeClr val="accent1"/>
+          </a:fillRef>
+          <a:effectRef idx="0">
+            <a:schemeClr val="accent1"/>
+          </a:effectRef>
+          <a:fontRef idx="minor">
+            <a:schemeClr val="lt1"/>
+          </a:fontRef>
+        </p:style>
+        <p:txBody>
+          <a:bodyPr rot="0" spcFirstLastPara="0" vertOverflow="overflow" horzOverflow="overflow" vert="horz" wrap="square" lIns="91440" tIns="45720" rIns="91440" bIns="45720" numCol="1" spcCol="0" rtlCol="0" fromWordArt="0" anchor="ctr" anchorCtr="0" forceAA="0" compatLnSpc="1">
+            <a:prstTxWarp prst="textNoShape">
+              <a:avLst/>
+            </a:prstTxWarp>
+            <a:noAutofit/>
+          </a:bodyPr>
+          <a:lstStyle/>
+          <a:p>
+            <a:pPr algn="ctr">
+              <a:lnSpc>
+                <a:spcPts val="2000"/>
+              </a:lnSpc>
+            </a:pPr>
+            <a:r>
+              <a:rPr lang="en-US" sz="2400" dirty="0" smtClean="0">
+                <a:solidFill>
+                  <a:schemeClr val="tx1"/>
+                </a:solidFill>
+              </a:rPr>
+              <a:t>C128</a:t>
+            </a:r>
+            <a:br>
+              <a:rPr lang="en-US" sz="2400" dirty="0" smtClean="0">
+                <a:solidFill>
+                  <a:schemeClr val="tx1"/>
+                </a:solidFill>
+              </a:rPr>
+            </a:br>
+            <a:r>
+              <a:rPr lang="en-US" sz="2400" dirty="0" smtClean="0">
+                <a:solidFill>
+                  <a:schemeClr val="tx1"/>
+                </a:solidFill>
+              </a:rPr>
+              <a:t>BASIC</a:t>
+            </a:r>
+            <a:endParaRPr lang="en-US" sz="2400" dirty="0" smtClean="0">
+              <a:solidFill>
+                <a:schemeClr val="tx1"/>
+              </a:solidFill>
+            </a:endParaRPr>
+          </a:p>
+        </p:txBody>
+      </p:sp>
+      <p:cxnSp>
+        <p:nvCxnSpPr>
+          <p:cNvPr id="33" name="Straight Arrow Connector 32"/>
+          <p:cNvCxnSpPr>
+            <a:stCxn id="23" idx="3"/>
+            <a:endCxn id="31" idx="1"/>
+          </p:cNvCxnSpPr>
+          <p:nvPr/>
+        </p:nvCxnSpPr>
+        <p:spPr>
+          <a:xfrm>
+            <a:off x="5752532" y="3770193"/>
+            <a:ext cx="1837899" cy="1044906"/>
+          </a:xfrm>
+          <a:prstGeom prst="straightConnector1">
+            <a:avLst/>
+          </a:prstGeom>
+          <a:ln w="25400">
+            <a:solidFill>
+              <a:schemeClr val="tx1"/>
+            </a:solidFill>
+            <a:headEnd type="none" w="lg" len="lg"/>
+            <a:tailEnd type="triangle" w="lg" len="lg"/>
+          </a:ln>
+        </p:spPr>
+        <p:style>
+          <a:lnRef idx="1">
+            <a:schemeClr val="dk1"/>
+          </a:lnRef>
+          <a:fillRef idx="0">
+            <a:schemeClr val="dk1"/>
+          </a:fillRef>
+          <a:effectRef idx="0">
+            <a:schemeClr val="dk1"/>
+          </a:effectRef>
+          <a:fontRef idx="minor">
+            <a:schemeClr val="tx1"/>
+          </a:fontRef>
+        </p:style>
+      </p:cxnSp>
     </p:spTree>
     <p:extLst>
       <p:ext uri="{BB962C8B-B14F-4D97-AF65-F5344CB8AC3E}">

</xml_diff>